<commit_message>
Updated the HTMLs. Left the video HTML.
Updated the HTMLs. Left the video HTML.
</commit_message>
<xml_diff>
--- a/Team10/Title Page/team10_title_page.pptx
+++ b/Team10/Title Page/team10_title_page.pptx
@@ -110,14 +110,6 @@
     </p:ext>
   </p:extLst>
 </p:presentation>
-</file>
-
-<file path=ppt/revisionInfo.xml><?xml version="1.0" encoding="utf-8"?>
-<p1510:revInfo xmlns:a="http://schemas.openxmlformats.org/drawingml/2006/main" xmlns:r="http://schemas.openxmlformats.org/officeDocument/2006/relationships" xmlns:p1510="http://schemas.microsoft.com/office/powerpoint/2015/10/main">
-  <p1510:revLst>
-    <p1510:client id="{517FF354-2D7E-DC41-A5F4-615012062126}" v="8" dt="2023-04-21T06:45:53.015"/>
-  </p1510:revLst>
-</p1510:revInfo>
 </file>
 
 <file path=ppt/changesInfos/changesInfo1.xml><?xml version="1.0" encoding="utf-8"?>
@@ -258,6 +250,30 @@
       </pc:sldChg>
     </pc:docChg>
   </pc:docChgLst>
+  <pc:docChgLst>
+    <pc:chgData name="Student - Robin Yeo Shao Jie" userId="9ca3d723-6372-419b-be21-ee14be45092e" providerId="ADAL" clId="{BC4E56DE-F9A0-9F41-B1E0-518A2ECEDFEB}"/>
+    <pc:docChg chg="modSld">
+      <pc:chgData name="Student - Robin Yeo Shao Jie" userId="9ca3d723-6372-419b-be21-ee14be45092e" providerId="ADAL" clId="{BC4E56DE-F9A0-9F41-B1E0-518A2ECEDFEB}" dt="2023-04-22T08:36:06.873" v="5" actId="20577"/>
+      <pc:docMkLst>
+        <pc:docMk/>
+      </pc:docMkLst>
+      <pc:sldChg chg="modSp mod">
+        <pc:chgData name="Student - Robin Yeo Shao Jie" userId="9ca3d723-6372-419b-be21-ee14be45092e" providerId="ADAL" clId="{BC4E56DE-F9A0-9F41-B1E0-518A2ECEDFEB}" dt="2023-04-22T08:36:06.873" v="5" actId="20577"/>
+        <pc:sldMkLst>
+          <pc:docMk/>
+          <pc:sldMk cId="3874723340" sldId="256"/>
+        </pc:sldMkLst>
+        <pc:spChg chg="mod">
+          <ac:chgData name="Student - Robin Yeo Shao Jie" userId="9ca3d723-6372-419b-be21-ee14be45092e" providerId="ADAL" clId="{BC4E56DE-F9A0-9F41-B1E0-518A2ECEDFEB}" dt="2023-04-22T08:36:06.873" v="5" actId="20577"/>
+          <ac:spMkLst>
+            <pc:docMk/>
+            <pc:sldMk cId="3874723340" sldId="256"/>
+            <ac:spMk id="14" creationId="{CC58C756-5D62-5359-4FC6-5291DE74FE79}"/>
+          </ac:spMkLst>
+        </pc:spChg>
+      </pc:sldChg>
+    </pc:docChg>
+  </pc:docChgLst>
 </pc:chgInfo>
 </file>
 
@@ -408,7 +424,7 @@
           <a:p>
             <a:fld id="{D8F8DCE9-E78B-4C6F-8F9C-BC53F5D1F0AF}" type="datetimeFigureOut">
               <a:rPr lang="en-US" smtClean="0"/>
-              <a:t>4/21/23</a:t>
+              <a:t>4/22/23</a:t>
             </a:fld>
             <a:endParaRPr lang="en-US"/>
           </a:p>
@@ -606,7 +622,7 @@
           <a:p>
             <a:fld id="{D8F8DCE9-E78B-4C6F-8F9C-BC53F5D1F0AF}" type="datetimeFigureOut">
               <a:rPr lang="en-US" smtClean="0"/>
-              <a:t>4/21/23</a:t>
+              <a:t>4/22/23</a:t>
             </a:fld>
             <a:endParaRPr lang="en-US"/>
           </a:p>
@@ -814,7 +830,7 @@
           <a:p>
             <a:fld id="{D8F8DCE9-E78B-4C6F-8F9C-BC53F5D1F0AF}" type="datetimeFigureOut">
               <a:rPr lang="en-US" smtClean="0"/>
-              <a:t>4/21/23</a:t>
+              <a:t>4/22/23</a:t>
             </a:fld>
             <a:endParaRPr lang="en-US"/>
           </a:p>
@@ -1012,7 +1028,7 @@
           <a:p>
             <a:fld id="{D8F8DCE9-E78B-4C6F-8F9C-BC53F5D1F0AF}" type="datetimeFigureOut">
               <a:rPr lang="en-US" smtClean="0"/>
-              <a:t>4/21/23</a:t>
+              <a:t>4/22/23</a:t>
             </a:fld>
             <a:endParaRPr lang="en-US"/>
           </a:p>
@@ -1287,7 +1303,7 @@
           <a:p>
             <a:fld id="{D8F8DCE9-E78B-4C6F-8F9C-BC53F5D1F0AF}" type="datetimeFigureOut">
               <a:rPr lang="en-US" smtClean="0"/>
-              <a:t>4/21/23</a:t>
+              <a:t>4/22/23</a:t>
             </a:fld>
             <a:endParaRPr lang="en-US"/>
           </a:p>
@@ -1552,7 +1568,7 @@
           <a:p>
             <a:fld id="{D8F8DCE9-E78B-4C6F-8F9C-BC53F5D1F0AF}" type="datetimeFigureOut">
               <a:rPr lang="en-US" smtClean="0"/>
-              <a:t>4/21/23</a:t>
+              <a:t>4/22/23</a:t>
             </a:fld>
             <a:endParaRPr lang="en-US"/>
           </a:p>
@@ -1964,7 +1980,7 @@
           <a:p>
             <a:fld id="{D8F8DCE9-E78B-4C6F-8F9C-BC53F5D1F0AF}" type="datetimeFigureOut">
               <a:rPr lang="en-US" smtClean="0"/>
-              <a:t>4/21/23</a:t>
+              <a:t>4/22/23</a:t>
             </a:fld>
             <a:endParaRPr lang="en-US"/>
           </a:p>
@@ -2105,7 +2121,7 @@
           <a:p>
             <a:fld id="{D8F8DCE9-E78B-4C6F-8F9C-BC53F5D1F0AF}" type="datetimeFigureOut">
               <a:rPr lang="en-US" smtClean="0"/>
-              <a:t>4/21/23</a:t>
+              <a:t>4/22/23</a:t>
             </a:fld>
             <a:endParaRPr lang="en-US"/>
           </a:p>
@@ -2218,7 +2234,7 @@
           <a:p>
             <a:fld id="{D8F8DCE9-E78B-4C6F-8F9C-BC53F5D1F0AF}" type="datetimeFigureOut">
               <a:rPr lang="en-US" smtClean="0"/>
-              <a:t>4/21/23</a:t>
+              <a:t>4/22/23</a:t>
             </a:fld>
             <a:endParaRPr lang="en-US"/>
           </a:p>
@@ -2529,7 +2545,7 @@
           <a:p>
             <a:fld id="{D8F8DCE9-E78B-4C6F-8F9C-BC53F5D1F0AF}" type="datetimeFigureOut">
               <a:rPr lang="en-US" smtClean="0"/>
-              <a:t>4/21/23</a:t>
+              <a:t>4/22/23</a:t>
             </a:fld>
             <a:endParaRPr lang="en-US"/>
           </a:p>
@@ -2817,7 +2833,7 @@
           <a:p>
             <a:fld id="{D8F8DCE9-E78B-4C6F-8F9C-BC53F5D1F0AF}" type="datetimeFigureOut">
               <a:rPr lang="en-US" smtClean="0"/>
-              <a:t>4/21/23</a:t>
+              <a:t>4/22/23</a:t>
             </a:fld>
             <a:endParaRPr lang="en-US"/>
           </a:p>
@@ -3058,7 +3074,7 @@
           <a:p>
             <a:fld id="{D8F8DCE9-E78B-4C6F-8F9C-BC53F5D1F0AF}" type="datetimeFigureOut">
               <a:rPr lang="en-US" smtClean="0"/>
-              <a:t>4/21/23</a:t>
+              <a:t>4/22/23</a:t>
             </a:fld>
             <a:endParaRPr lang="en-US"/>
           </a:p>
@@ -4190,7 +4206,16 @@
                 <a:ea typeface="Times New Roman" panose="02020603050405020304" pitchFamily="18" charset="0"/>
                 <a:cs typeface="Calibri" panose="020F0502020204030204" pitchFamily="34" charset="0"/>
               </a:rPr>
-              <a:t>Danny Yeo Rui Quan | 1005646</a:t>
+              <a:t>Danny Yeo Rui Quan </a:t>
+            </a:r>
+            <a:r>
+              <a:rPr lang="en-GB" sz="1800">
+                <a:effectLst/>
+                <a:latin typeface="Calibri" panose="020F0502020204030204" pitchFamily="34" charset="0"/>
+                <a:ea typeface="Times New Roman" panose="02020603050405020304" pitchFamily="18" charset="0"/>
+                <a:cs typeface="Calibri" panose="020F0502020204030204" pitchFamily="34" charset="0"/>
+              </a:rPr>
+              <a:t>| 1005138</a:t>
             </a:r>
             <a:endParaRPr lang="en-SG" sz="1400" dirty="0">
               <a:effectLst/>
@@ -4717,6 +4742,21 @@
 </file>
 
 <file path=customXml/item1.xml><?xml version="1.0" encoding="utf-8"?>
+<p:properties xmlns:p="http://schemas.microsoft.com/office/2006/metadata/properties" xmlns:xsi="http://www.w3.org/2001/XMLSchema-instance" xmlns:pc="http://schemas.microsoft.com/office/infopath/2007/PartnerControls">
+  <documentManagement/>
+</p:properties>
+</file>
+
+<file path=customXml/item2.xml><?xml version="1.0" encoding="utf-8"?>
+<?mso-contentType ?>
+<FormTemplates xmlns="http://schemas.microsoft.com/sharepoint/v3/contenttype/forms">
+  <Display>DocumentLibraryForm</Display>
+  <Edit>DocumentLibraryForm</Edit>
+  <New>DocumentLibraryForm</New>
+</FormTemplates>
+</file>
+
+<file path=customXml/item3.xml><?xml version="1.0" encoding="utf-8"?>
 <ct:contentTypeSchema xmlns:ct="http://schemas.microsoft.com/office/2006/metadata/contentType" xmlns:ma="http://schemas.microsoft.com/office/2006/metadata/properties/metaAttributes" ct:_="" ma:_="" ma:contentTypeName="Document" ma:contentTypeID="0x010100BA349CA163C1864D811B58E7F5BBFA29" ma:contentTypeVersion="0" ma:contentTypeDescription="Create a new document." ma:contentTypeScope="" ma:versionID="80775ed679ba877138d56043bb56b4f2">
   <xsd:schema xmlns:xsd="http://www.w3.org/2001/XMLSchema" xmlns:xs="http://www.w3.org/2001/XMLSchema" xmlns:p="http://schemas.microsoft.com/office/2006/metadata/properties" targetNamespace="http://schemas.microsoft.com/office/2006/metadata/properties" ma:root="true" ma:fieldsID="b34f15b030d40ffca33e4aeb8eb001f5">
     <xsd:element name="properties">
@@ -4830,22 +4870,30 @@
 </ct:contentTypeSchema>
 </file>
 
-<file path=customXml/item2.xml><?xml version="1.0" encoding="utf-8"?>
-<?mso-contentType ?>
-<FormTemplates xmlns="http://schemas.microsoft.com/sharepoint/v3/contenttype/forms">
-  <Display>DocumentLibraryForm</Display>
-  <Edit>DocumentLibraryForm</Edit>
-  <New>DocumentLibraryForm</New>
-</FormTemplates>
+<file path=customXml/itemProps1.xml><?xml version="1.0" encoding="utf-8"?>
+<ds:datastoreItem xmlns:ds="http://schemas.openxmlformats.org/officeDocument/2006/customXml" ds:itemID="{4BB027CD-EB3E-438B-A6FC-AF0F30CA560D}">
+  <ds:schemaRefs>
+    <ds:schemaRef ds:uri="http://purl.org/dc/elements/1.1/"/>
+    <ds:schemaRef ds:uri="http://purl.org/dc/dcmitype/"/>
+    <ds:schemaRef ds:uri="http://purl.org/dc/terms/"/>
+    <ds:schemaRef ds:uri="http://schemas.microsoft.com/office/infopath/2007/PartnerControls"/>
+    <ds:schemaRef ds:uri="http://schemas.microsoft.com/office/2006/documentManagement/types"/>
+    <ds:schemaRef ds:uri="http://schemas.microsoft.com/office/2006/metadata/properties"/>
+    <ds:schemaRef ds:uri="http://schemas.openxmlformats.org/package/2006/metadata/core-properties"/>
+    <ds:schemaRef ds:uri="http://www.w3.org/XML/1998/namespace"/>
+  </ds:schemaRefs>
+</ds:datastoreItem>
 </file>
 
-<file path=customXml/item3.xml><?xml version="1.0" encoding="utf-8"?>
-<p:properties xmlns:p="http://schemas.microsoft.com/office/2006/metadata/properties" xmlns:xsi="http://www.w3.org/2001/XMLSchema-instance" xmlns:pc="http://schemas.microsoft.com/office/infopath/2007/PartnerControls">
-  <documentManagement/>
-</p:properties>
+<file path=customXml/itemProps2.xml><?xml version="1.0" encoding="utf-8"?>
+<ds:datastoreItem xmlns:ds="http://schemas.openxmlformats.org/officeDocument/2006/customXml" ds:itemID="{576EAD67-EB09-463E-A8E5-A1F621A6E266}">
+  <ds:schemaRefs>
+    <ds:schemaRef ds:uri="http://schemas.microsoft.com/sharepoint/v3/contenttype/forms"/>
+  </ds:schemaRefs>
+</ds:datastoreItem>
 </file>
 
-<file path=customXml/itemProps1.xml><?xml version="1.0" encoding="utf-8"?>
+<file path=customXml/itemProps3.xml><?xml version="1.0" encoding="utf-8"?>
 <ds:datastoreItem xmlns:ds="http://schemas.openxmlformats.org/officeDocument/2006/customXml" ds:itemID="{D712E232-F970-41BD-B7E8-EBBD10589505}">
   <ds:schemaRefs>
     <ds:schemaRef ds:uri="http://schemas.microsoft.com/office/2006/metadata/contentType"/>
@@ -4859,27 +4907,4 @@
     <ds:schemaRef ds:uri="http://schemas.microsoft.com/office/infopath/2007/PartnerControls"/>
   </ds:schemaRefs>
 </ds:datastoreItem>
-</file>
-
-<file path=customXml/itemProps2.xml><?xml version="1.0" encoding="utf-8"?>
-<ds:datastoreItem xmlns:ds="http://schemas.openxmlformats.org/officeDocument/2006/customXml" ds:itemID="{576EAD67-EB09-463E-A8E5-A1F621A6E266}">
-  <ds:schemaRefs>
-    <ds:schemaRef ds:uri="http://schemas.microsoft.com/sharepoint/v3/contenttype/forms"/>
-  </ds:schemaRefs>
-</ds:datastoreItem>
-</file>
-
-<file path=customXml/itemProps3.xml><?xml version="1.0" encoding="utf-8"?>
-<ds:datastoreItem xmlns:ds="http://schemas.openxmlformats.org/officeDocument/2006/customXml" ds:itemID="{4BB027CD-EB3E-438B-A6FC-AF0F30CA560D}">
-  <ds:schemaRefs>
-    <ds:schemaRef ds:uri="http://purl.org/dc/elements/1.1/"/>
-    <ds:schemaRef ds:uri="http://purl.org/dc/dcmitype/"/>
-    <ds:schemaRef ds:uri="http://schemas.microsoft.com/office/infopath/2007/PartnerControls"/>
-    <ds:schemaRef ds:uri="http://schemas.microsoft.com/office/2006/documentManagement/types"/>
-    <ds:schemaRef ds:uri="http://schemas.openxmlformats.org/package/2006/metadata/core-properties"/>
-    <ds:schemaRef ds:uri="http://schemas.microsoft.com/office/2006/metadata/properties"/>
-    <ds:schemaRef ds:uri="http://www.w3.org/XML/1998/namespace"/>
-    <ds:schemaRef ds:uri="http://purl.org/dc/terms/"/>
-  </ds:schemaRefs>
-</ds:datastoreItem>
 </file>
</xml_diff>